<commit_message>
Tweak Minecraft intro presentation
</commit_message>
<xml_diff>
--- a/docs/doc/TEALS Intro Presentation.pptx
+++ b/docs/doc/TEALS Intro Presentation.pptx
@@ -9,8 +9,8 @@
   </p:notesMasterIdLst>
   <p:sldIdLst>
     <p:sldId id="256" r:id="rId2"/>
-    <p:sldId id="257" r:id="rId3"/>
-    <p:sldId id="258" r:id="rId4"/>
+    <p:sldId id="258" r:id="rId3"/>
+    <p:sldId id="257" r:id="rId4"/>
     <p:sldId id="260" r:id="rId5"/>
     <p:sldId id="261" r:id="rId6"/>
     <p:sldId id="262" r:id="rId7"/>
@@ -289,7 +289,7 @@
           <a:p>
             <a:fld id="{EB77B052-3635-4A1A-BC91-C9A6354CF88E}" type="datetimeFigureOut">
               <a:rPr lang="en-US" smtClean="0"/>
-              <a:t>2017-04-19</a:t>
+              <a:t>2017-04-22</a:t>
             </a:fld>
             <a:endParaRPr lang="en-US"/>
           </a:p>
@@ -786,7 +786,7 @@
           <a:p>
             <a:fld id="{BD4101FD-5CF6-4E3D-BF36-722322E10D3E}" type="datetimeFigureOut">
               <a:rPr lang="en-US" smtClean="0"/>
-              <a:t>2017-04-19</a:t>
+              <a:t>2017-04-22</a:t>
             </a:fld>
             <a:endParaRPr lang="en-US"/>
           </a:p>
@@ -972,7 +972,7 @@
           <a:p>
             <a:fld id="{BD4101FD-5CF6-4E3D-BF36-722322E10D3E}" type="datetimeFigureOut">
               <a:rPr lang="en-US" smtClean="0"/>
-              <a:t>2017-04-19</a:t>
+              <a:t>2017-04-22</a:t>
             </a:fld>
             <a:endParaRPr lang="en-US"/>
           </a:p>
@@ -1195,7 +1195,7 @@
           <a:p>
             <a:fld id="{BD4101FD-5CF6-4E3D-BF36-722322E10D3E}" type="datetimeFigureOut">
               <a:rPr lang="en-US" smtClean="0"/>
-              <a:t>2017-04-19</a:t>
+              <a:t>2017-04-22</a:t>
             </a:fld>
             <a:endParaRPr lang="en-US"/>
           </a:p>
@@ -1375,7 +1375,7 @@
           <a:p>
             <a:fld id="{BD4101FD-5CF6-4E3D-BF36-722322E10D3E}" type="datetimeFigureOut">
               <a:rPr lang="en-US" smtClean="0"/>
-              <a:t>2017-04-19</a:t>
+              <a:t>2017-04-22</a:t>
             </a:fld>
             <a:endParaRPr lang="en-US"/>
           </a:p>
@@ -1714,7 +1714,7 @@
           <a:p>
             <a:fld id="{BD4101FD-5CF6-4E3D-BF36-722322E10D3E}" type="datetimeFigureOut">
               <a:rPr lang="en-US" smtClean="0"/>
-              <a:t>2017-04-19</a:t>
+              <a:t>2017-04-22</a:t>
             </a:fld>
             <a:endParaRPr lang="en-US"/>
           </a:p>
@@ -2018,7 +2018,7 @@
           <a:p>
             <a:fld id="{BD4101FD-5CF6-4E3D-BF36-722322E10D3E}" type="datetimeFigureOut">
               <a:rPr lang="en-US" smtClean="0"/>
-              <a:t>2017-04-19</a:t>
+              <a:t>2017-04-22</a:t>
             </a:fld>
             <a:endParaRPr lang="en-US"/>
           </a:p>
@@ -2440,7 +2440,7 @@
           <a:p>
             <a:fld id="{BD4101FD-5CF6-4E3D-BF36-722322E10D3E}" type="datetimeFigureOut">
               <a:rPr lang="en-US" smtClean="0"/>
-              <a:t>2017-04-19</a:t>
+              <a:t>2017-04-22</a:t>
             </a:fld>
             <a:endParaRPr lang="en-US"/>
           </a:p>
@@ -2558,7 +2558,7 @@
           <a:p>
             <a:fld id="{BD4101FD-5CF6-4E3D-BF36-722322E10D3E}" type="datetimeFigureOut">
               <a:rPr lang="en-US" smtClean="0"/>
-              <a:t>2017-04-19</a:t>
+              <a:t>2017-04-22</a:t>
             </a:fld>
             <a:endParaRPr lang="en-US"/>
           </a:p>
@@ -2653,7 +2653,7 @@
           <a:p>
             <a:fld id="{BD4101FD-5CF6-4E3D-BF36-722322E10D3E}" type="datetimeFigureOut">
               <a:rPr lang="en-US" smtClean="0"/>
-              <a:t>2017-04-19</a:t>
+              <a:t>2017-04-22</a:t>
             </a:fld>
             <a:endParaRPr lang="en-US"/>
           </a:p>
@@ -2926,7 +2926,7 @@
           <a:p>
             <a:fld id="{BD4101FD-5CF6-4E3D-BF36-722322E10D3E}" type="datetimeFigureOut">
               <a:rPr lang="en-US" smtClean="0"/>
-              <a:t>2017-04-19</a:t>
+              <a:t>2017-04-22</a:t>
             </a:fld>
             <a:endParaRPr lang="en-US"/>
           </a:p>
@@ -3191,7 +3191,7 @@
           <a:p>
             <a:fld id="{BD4101FD-5CF6-4E3D-BF36-722322E10D3E}" type="datetimeFigureOut">
               <a:rPr lang="en-US" smtClean="0"/>
-              <a:t>2017-04-19</a:t>
+              <a:t>2017-04-22</a:t>
             </a:fld>
             <a:endParaRPr lang="en-US"/>
           </a:p>
@@ -3440,7 +3440,7 @@
           <a:p>
             <a:fld id="{BD4101FD-5CF6-4E3D-BF36-722322E10D3E}" type="datetimeFigureOut">
               <a:rPr lang="en-US" smtClean="0"/>
-              <a:t>2017-04-19</a:t>
+              <a:t>2017-04-22</a:t>
             </a:fld>
             <a:endParaRPr lang="en-US"/>
           </a:p>
@@ -4462,6 +4462,143 @@
           <a:p>
             <a:r>
               <a:rPr lang="en-US" dirty="0"/>
+              <a:t>Mods</a:t>
+            </a:r>
+          </a:p>
+        </p:txBody>
+      </p:sp>
+      <p:sp>
+        <p:nvSpPr>
+          <p:cNvPr id="3" name="Content Placeholder 2"/>
+          <p:cNvSpPr>
+            <a:spLocks noGrp="1"/>
+          </p:cNvSpPr>
+          <p:nvPr>
+            <p:ph idx="1"/>
+          </p:nvPr>
+        </p:nvSpPr>
+        <p:spPr>
+          <a:xfrm>
+            <a:off x="334239" y="2399913"/>
+            <a:ext cx="5803809" cy="3710940"/>
+          </a:xfrm>
+        </p:spPr>
+        <p:txBody>
+          <a:bodyPr/>
+          <a:lstStyle/>
+          <a:p>
+            <a:r>
+              <a:rPr lang="en-US" dirty="0"/>
+              <a:t>Server modifications (plugins)</a:t>
+            </a:r>
+          </a:p>
+          <a:p>
+            <a:pPr lvl="1"/>
+            <a:r>
+              <a:rPr lang="en-US" dirty="0"/>
+              <a:t>Used on standard client</a:t>
+            </a:r>
+          </a:p>
+          <a:p>
+            <a:pPr lvl="1"/>
+            <a:r>
+              <a:rPr lang="en-US" dirty="0"/>
+              <a:t>Modifies current game assets</a:t>
+            </a:r>
+          </a:p>
+          <a:p>
+            <a:r>
+              <a:rPr lang="en-US" dirty="0"/>
+              <a:t>Client modifications</a:t>
+            </a:r>
+          </a:p>
+          <a:p>
+            <a:pPr lvl="1"/>
+            <a:r>
+              <a:rPr lang="en-US" dirty="0"/>
+              <a:t>Create or modify game assets</a:t>
+            </a:r>
+          </a:p>
+          <a:p>
+            <a:pPr lvl="1"/>
+            <a:r>
+              <a:rPr lang="en-US" dirty="0"/>
+              <a:t>Only works on servers with the same mod</a:t>
+            </a:r>
+          </a:p>
+        </p:txBody>
+      </p:sp>
+      <p:pic>
+        <p:nvPicPr>
+          <p:cNvPr id="4" name="Picture 3"/>
+          <p:cNvPicPr>
+            <a:picLocks noChangeAspect="1"/>
+          </p:cNvPicPr>
+          <p:nvPr/>
+        </p:nvPicPr>
+        <p:blipFill>
+          <a:blip r:embed="rId2"/>
+          <a:stretch>
+            <a:fillRect/>
+          </a:stretch>
+        </p:blipFill>
+        <p:spPr>
+          <a:xfrm>
+            <a:off x="6138048" y="2399913"/>
+            <a:ext cx="5630061" cy="3543795"/>
+          </a:xfrm>
+          <a:prstGeom prst="rect">
+            <a:avLst/>
+          </a:prstGeom>
+        </p:spPr>
+      </p:pic>
+    </p:spTree>
+    <p:extLst>
+      <p:ext uri="{BB962C8B-B14F-4D97-AF65-F5344CB8AC3E}">
+        <p14:creationId xmlns:p14="http://schemas.microsoft.com/office/powerpoint/2010/main" val="378465365"/>
+      </p:ext>
+    </p:extLst>
+  </p:cSld>
+  <p:clrMapOvr>
+    <a:masterClrMapping/>
+  </p:clrMapOvr>
+</p:sld>
+</file>
+
+<file path=ppt/slides/slide3.xml><?xml version="1.0" encoding="utf-8"?>
+<p:sld xmlns:a="http://schemas.openxmlformats.org/drawingml/2006/main" xmlns:r="http://schemas.openxmlformats.org/officeDocument/2006/relationships" xmlns:p="http://schemas.openxmlformats.org/presentationml/2006/main">
+  <p:cSld>
+    <p:spTree>
+      <p:nvGrpSpPr>
+        <p:cNvPr id="1" name=""/>
+        <p:cNvGrpSpPr/>
+        <p:nvPr/>
+      </p:nvGrpSpPr>
+      <p:grpSpPr>
+        <a:xfrm>
+          <a:off x="0" y="0"/>
+          <a:ext cx="0" cy="0"/>
+          <a:chOff x="0" y="0"/>
+          <a:chExt cx="0" cy="0"/>
+        </a:xfrm>
+      </p:grpSpPr>
+      <p:sp>
+        <p:nvSpPr>
+          <p:cNvPr id="2" name="Title 1"/>
+          <p:cNvSpPr>
+            <a:spLocks noGrp="1"/>
+          </p:cNvSpPr>
+          <p:nvPr>
+            <p:ph type="title"/>
+          </p:nvPr>
+        </p:nvSpPr>
+        <p:spPr/>
+        <p:txBody>
+          <a:bodyPr/>
+          <a:lstStyle/>
+          <a:p>
+            <a:r>
+              <a:rPr lang="en-US" dirty="0"/>
               <a:t>Implementation</a:t>
             </a:r>
           </a:p>
@@ -4489,7 +4626,7 @@
           <a:p>
             <a:r>
               <a:rPr lang="en-US" dirty="0"/>
-              <a:t>Written in Java</a:t>
+              <a:t>Everything’s Written in Java</a:t>
             </a:r>
           </a:p>
           <a:p>
@@ -4638,143 +4775,6 @@
     <p:extLst>
       <p:ext uri="{BB962C8B-B14F-4D97-AF65-F5344CB8AC3E}">
         <p14:creationId xmlns:p14="http://schemas.microsoft.com/office/powerpoint/2010/main" val="145032084"/>
-      </p:ext>
-    </p:extLst>
-  </p:cSld>
-  <p:clrMapOvr>
-    <a:masterClrMapping/>
-  </p:clrMapOvr>
-</p:sld>
-</file>
-
-<file path=ppt/slides/slide3.xml><?xml version="1.0" encoding="utf-8"?>
-<p:sld xmlns:a="http://schemas.openxmlformats.org/drawingml/2006/main" xmlns:r="http://schemas.openxmlformats.org/officeDocument/2006/relationships" xmlns:p="http://schemas.openxmlformats.org/presentationml/2006/main">
-  <p:cSld>
-    <p:spTree>
-      <p:nvGrpSpPr>
-        <p:cNvPr id="1" name=""/>
-        <p:cNvGrpSpPr/>
-        <p:nvPr/>
-      </p:nvGrpSpPr>
-      <p:grpSpPr>
-        <a:xfrm>
-          <a:off x="0" y="0"/>
-          <a:ext cx="0" cy="0"/>
-          <a:chOff x="0" y="0"/>
-          <a:chExt cx="0" cy="0"/>
-        </a:xfrm>
-      </p:grpSpPr>
-      <p:sp>
-        <p:nvSpPr>
-          <p:cNvPr id="2" name="Title 1"/>
-          <p:cNvSpPr>
-            <a:spLocks noGrp="1"/>
-          </p:cNvSpPr>
-          <p:nvPr>
-            <p:ph type="title"/>
-          </p:nvPr>
-        </p:nvSpPr>
-        <p:spPr/>
-        <p:txBody>
-          <a:bodyPr/>
-          <a:lstStyle/>
-          <a:p>
-            <a:r>
-              <a:rPr lang="en-US" dirty="0"/>
-              <a:t>Mods</a:t>
-            </a:r>
-          </a:p>
-        </p:txBody>
-      </p:sp>
-      <p:sp>
-        <p:nvSpPr>
-          <p:cNvPr id="3" name="Content Placeholder 2"/>
-          <p:cNvSpPr>
-            <a:spLocks noGrp="1"/>
-          </p:cNvSpPr>
-          <p:nvPr>
-            <p:ph idx="1"/>
-          </p:nvPr>
-        </p:nvSpPr>
-        <p:spPr>
-          <a:xfrm>
-            <a:off x="334239" y="2399913"/>
-            <a:ext cx="5803809" cy="3710940"/>
-          </a:xfrm>
-        </p:spPr>
-        <p:txBody>
-          <a:bodyPr/>
-          <a:lstStyle/>
-          <a:p>
-            <a:r>
-              <a:rPr lang="en-US" dirty="0"/>
-              <a:t>Server modifications (plugins)</a:t>
-            </a:r>
-          </a:p>
-          <a:p>
-            <a:pPr lvl="1"/>
-            <a:r>
-              <a:rPr lang="en-US" dirty="0"/>
-              <a:t>Used on standard client</a:t>
-            </a:r>
-          </a:p>
-          <a:p>
-            <a:pPr lvl="1"/>
-            <a:r>
-              <a:rPr lang="en-US" dirty="0"/>
-              <a:t>Modifies current game assets</a:t>
-            </a:r>
-          </a:p>
-          <a:p>
-            <a:r>
-              <a:rPr lang="en-US" dirty="0"/>
-              <a:t>Client modifications</a:t>
-            </a:r>
-          </a:p>
-          <a:p>
-            <a:pPr lvl="1"/>
-            <a:r>
-              <a:rPr lang="en-US" dirty="0"/>
-              <a:t>Create or modify game assets</a:t>
-            </a:r>
-          </a:p>
-          <a:p>
-            <a:pPr lvl="1"/>
-            <a:r>
-              <a:rPr lang="en-US" dirty="0"/>
-              <a:t>Only works on servers with the same mod</a:t>
-            </a:r>
-          </a:p>
-        </p:txBody>
-      </p:sp>
-      <p:pic>
-        <p:nvPicPr>
-          <p:cNvPr id="4" name="Picture 3"/>
-          <p:cNvPicPr>
-            <a:picLocks noChangeAspect="1"/>
-          </p:cNvPicPr>
-          <p:nvPr/>
-        </p:nvPicPr>
-        <p:blipFill>
-          <a:blip r:embed="rId2"/>
-          <a:stretch>
-            <a:fillRect/>
-          </a:stretch>
-        </p:blipFill>
-        <p:spPr>
-          <a:xfrm>
-            <a:off x="6138048" y="2399913"/>
-            <a:ext cx="5630061" cy="3543795"/>
-          </a:xfrm>
-          <a:prstGeom prst="rect">
-            <a:avLst/>
-          </a:prstGeom>
-        </p:spPr>
-      </p:pic>
-    </p:spTree>
-    <p:extLst>
-      <p:ext uri="{BB962C8B-B14F-4D97-AF65-F5344CB8AC3E}">
-        <p14:creationId xmlns:p14="http://schemas.microsoft.com/office/powerpoint/2010/main" val="378465365"/>
       </p:ext>
     </p:extLst>
   </p:cSld>

</xml_diff>

<commit_message>
Add notes to intro presentation + ref from home
</commit_message>
<xml_diff>
--- a/docs/doc/TEALS Intro Presentation.pptx
+++ b/docs/doc/TEALS Intro Presentation.pptx
@@ -7,6 +7,9 @@
   <p:notesMasterIdLst>
     <p:notesMasterId r:id="rId12"/>
   </p:notesMasterIdLst>
+  <p:handoutMasterIdLst>
+    <p:handoutMasterId r:id="rId13"/>
+  </p:handoutMasterIdLst>
   <p:sldIdLst>
     <p:sldId id="256" r:id="rId2"/>
     <p:sldId id="258" r:id="rId3"/>
@@ -127,6 +130,175 @@
 </p:presentation>
 </file>
 
+<file path=ppt/revisionInfo.xml><?xml version="1.0" encoding="utf-8"?>
+<p1510:revInfo xmlns:a="http://schemas.openxmlformats.org/drawingml/2006/main" xmlns:r="http://schemas.openxmlformats.org/officeDocument/2006/relationships" xmlns:p1510="http://schemas.microsoft.com/office/powerpoint/2015/10/main"/>
+</file>
+
+<file path=ppt/handoutMasters/handoutMaster1.xml><?xml version="1.0" encoding="utf-8"?>
+<p:handoutMaster xmlns:a="http://schemas.openxmlformats.org/drawingml/2006/main" xmlns:r="http://schemas.openxmlformats.org/officeDocument/2006/relationships" xmlns:p="http://schemas.openxmlformats.org/presentationml/2006/main">
+  <p:cSld>
+    <p:bg>
+      <p:bgRef idx="1001">
+        <a:schemeClr val="bg1"/>
+      </p:bgRef>
+    </p:bg>
+    <p:spTree>
+      <p:nvGrpSpPr>
+        <p:cNvPr id="1" name=""/>
+        <p:cNvGrpSpPr/>
+        <p:nvPr/>
+      </p:nvGrpSpPr>
+      <p:grpSpPr>
+        <a:xfrm>
+          <a:off x="0" y="0"/>
+          <a:ext cx="0" cy="0"/>
+          <a:chOff x="0" y="0"/>
+          <a:chExt cx="0" cy="0"/>
+        </a:xfrm>
+      </p:grpSpPr>
+      <p:sp>
+        <p:nvSpPr>
+          <p:cNvPr id="2" name="Header Placeholder 1"/>
+          <p:cNvSpPr>
+            <a:spLocks noGrp="1"/>
+          </p:cNvSpPr>
+          <p:nvPr>
+            <p:ph type="hdr" sz="quarter"/>
+          </p:nvPr>
+        </p:nvSpPr>
+        <p:spPr>
+          <a:xfrm>
+            <a:off x="0" y="0"/>
+            <a:ext cx="2971800" cy="458788"/>
+          </a:xfrm>
+          <a:prstGeom prst="rect">
+            <a:avLst/>
+          </a:prstGeom>
+        </p:spPr>
+        <p:txBody>
+          <a:bodyPr vert="horz" lIns="91440" tIns="45720" rIns="91440" bIns="45720" rtlCol="0"/>
+          <a:lstStyle>
+            <a:lvl1pPr algn="l">
+              <a:defRPr sz="1200"/>
+            </a:lvl1pPr>
+          </a:lstStyle>
+          <a:p>
+            <a:endParaRPr lang="en-US"/>
+          </a:p>
+        </p:txBody>
+      </p:sp>
+      <p:sp>
+        <p:nvSpPr>
+          <p:cNvPr id="3" name="Date Placeholder 2"/>
+          <p:cNvSpPr>
+            <a:spLocks noGrp="1"/>
+          </p:cNvSpPr>
+          <p:nvPr>
+            <p:ph type="dt" sz="quarter" idx="1"/>
+          </p:nvPr>
+        </p:nvSpPr>
+        <p:spPr>
+          <a:xfrm>
+            <a:off x="3884613" y="0"/>
+            <a:ext cx="2971800" cy="458788"/>
+          </a:xfrm>
+          <a:prstGeom prst="rect">
+            <a:avLst/>
+          </a:prstGeom>
+        </p:spPr>
+        <p:txBody>
+          <a:bodyPr vert="horz" lIns="91440" tIns="45720" rIns="91440" bIns="45720" rtlCol="0"/>
+          <a:lstStyle>
+            <a:lvl1pPr algn="r">
+              <a:defRPr sz="1200"/>
+            </a:lvl1pPr>
+          </a:lstStyle>
+          <a:p>
+            <a:fld id="{DACC959C-7CDA-4B15-A19B-EFE312F0EDAD}" type="datetimeFigureOut">
+              <a:rPr lang="en-US" smtClean="0"/>
+              <a:t>2017-05-03</a:t>
+            </a:fld>
+            <a:endParaRPr lang="en-US"/>
+          </a:p>
+        </p:txBody>
+      </p:sp>
+      <p:sp>
+        <p:nvSpPr>
+          <p:cNvPr id="4" name="Footer Placeholder 3"/>
+          <p:cNvSpPr>
+            <a:spLocks noGrp="1"/>
+          </p:cNvSpPr>
+          <p:nvPr>
+            <p:ph type="ftr" sz="quarter" idx="2"/>
+          </p:nvPr>
+        </p:nvSpPr>
+        <p:spPr>
+          <a:xfrm>
+            <a:off x="0" y="8685213"/>
+            <a:ext cx="2971800" cy="458787"/>
+          </a:xfrm>
+          <a:prstGeom prst="rect">
+            <a:avLst/>
+          </a:prstGeom>
+        </p:spPr>
+        <p:txBody>
+          <a:bodyPr vert="horz" lIns="91440" tIns="45720" rIns="91440" bIns="45720" rtlCol="0" anchor="b"/>
+          <a:lstStyle>
+            <a:lvl1pPr algn="l">
+              <a:defRPr sz="1200"/>
+            </a:lvl1pPr>
+          </a:lstStyle>
+          <a:p>
+            <a:endParaRPr lang="en-US"/>
+          </a:p>
+        </p:txBody>
+      </p:sp>
+      <p:sp>
+        <p:nvSpPr>
+          <p:cNvPr id="5" name="Slide Number Placeholder 4"/>
+          <p:cNvSpPr>
+            <a:spLocks noGrp="1"/>
+          </p:cNvSpPr>
+          <p:nvPr>
+            <p:ph type="sldNum" sz="quarter" idx="3"/>
+          </p:nvPr>
+        </p:nvSpPr>
+        <p:spPr>
+          <a:xfrm>
+            <a:off x="3884613" y="8685213"/>
+            <a:ext cx="2971800" cy="458787"/>
+          </a:xfrm>
+          <a:prstGeom prst="rect">
+            <a:avLst/>
+          </a:prstGeom>
+        </p:spPr>
+        <p:txBody>
+          <a:bodyPr vert="horz" lIns="91440" tIns="45720" rIns="91440" bIns="45720" rtlCol="0" anchor="b"/>
+          <a:lstStyle>
+            <a:lvl1pPr algn="r">
+              <a:defRPr sz="1200"/>
+            </a:lvl1pPr>
+          </a:lstStyle>
+          <a:p>
+            <a:fld id="{6D1B2709-3C97-4D92-9426-D5987D54FE86}" type="slidenum">
+              <a:rPr lang="en-US" smtClean="0"/>
+              <a:t>‹#›</a:t>
+            </a:fld>
+            <a:endParaRPr lang="en-US"/>
+          </a:p>
+        </p:txBody>
+      </p:sp>
+    </p:spTree>
+    <p:extLst>
+      <p:ext uri="{BB962C8B-B14F-4D97-AF65-F5344CB8AC3E}">
+        <p14:creationId xmlns:p14="http://schemas.microsoft.com/office/powerpoint/2010/main" val="2807818918"/>
+      </p:ext>
+    </p:extLst>
+  </p:cSld>
+  <p:clrMap bg1="lt1" tx1="dk1" bg2="lt2" tx2="dk2" accent1="accent1" accent2="accent2" accent3="accent3" accent4="accent4" accent5="accent5" accent6="accent6" hlink="hlink" folHlink="folHlink"/>
+</p:handoutMaster>
+</file>
+
 <file path=ppt/ink/ink1.xml><?xml version="1.0" encoding="utf-8"?>
 <inkml:ink xmlns:inkml="http://www.w3.org/2003/InkML">
   <inkml:definitions>
@@ -289,7 +461,7 @@
           <a:p>
             <a:fld id="{EB77B052-3635-4A1A-BC91-C9A6354CF88E}" type="datetimeFigureOut">
               <a:rPr lang="en-US" smtClean="0"/>
-              <a:t>2017-04-22</a:t>
+              <a:t>2017-05-03</a:t>
             </a:fld>
             <a:endParaRPr lang="en-US"/>
           </a:p>
@@ -556,6 +728,805 @@
 </p:notesMaster>
 </file>
 
+<file path=ppt/notesSlides/notesSlide1.xml><?xml version="1.0" encoding="utf-8"?>
+<p:notes xmlns:a="http://schemas.openxmlformats.org/drawingml/2006/main" xmlns:r="http://schemas.openxmlformats.org/officeDocument/2006/relationships" xmlns:p="http://schemas.openxmlformats.org/presentationml/2006/main">
+  <p:cSld>
+    <p:spTree>
+      <p:nvGrpSpPr>
+        <p:cNvPr id="1" name=""/>
+        <p:cNvGrpSpPr/>
+        <p:nvPr/>
+      </p:nvGrpSpPr>
+      <p:grpSpPr>
+        <a:xfrm>
+          <a:off x="0" y="0"/>
+          <a:ext cx="0" cy="0"/>
+          <a:chOff x="0" y="0"/>
+          <a:chExt cx="0" cy="0"/>
+        </a:xfrm>
+      </p:grpSpPr>
+      <p:sp>
+        <p:nvSpPr>
+          <p:cNvPr id="2" name="Slide Image Placeholder 1"/>
+          <p:cNvSpPr>
+            <a:spLocks noGrp="1" noRot="1" noChangeAspect="1"/>
+          </p:cNvSpPr>
+          <p:nvPr>
+            <p:ph type="sldImg"/>
+          </p:nvPr>
+        </p:nvSpPr>
+        <p:spPr/>
+      </p:sp>
+      <p:sp>
+        <p:nvSpPr>
+          <p:cNvPr id="3" name="Notes Placeholder 2"/>
+          <p:cNvSpPr>
+            <a:spLocks noGrp="1"/>
+          </p:cNvSpPr>
+          <p:nvPr>
+            <p:ph type="body" idx="1"/>
+          </p:nvPr>
+        </p:nvSpPr>
+        <p:spPr/>
+        <p:txBody>
+          <a:bodyPr/>
+          <a:lstStyle/>
+          <a:p>
+            <a:endParaRPr lang="en-US" dirty="0"/>
+          </a:p>
+        </p:txBody>
+      </p:sp>
+      <p:sp>
+        <p:nvSpPr>
+          <p:cNvPr id="4" name="Slide Number Placeholder 3"/>
+          <p:cNvSpPr>
+            <a:spLocks noGrp="1"/>
+          </p:cNvSpPr>
+          <p:nvPr>
+            <p:ph type="sldNum" sz="quarter" idx="10"/>
+          </p:nvPr>
+        </p:nvSpPr>
+        <p:spPr/>
+        <p:txBody>
+          <a:bodyPr/>
+          <a:lstStyle/>
+          <a:p>
+            <a:fld id="{20BEAC3D-4815-4450-806D-C5E8D961EB40}" type="slidenum">
+              <a:rPr lang="en-US" smtClean="0"/>
+              <a:t>1</a:t>
+            </a:fld>
+            <a:endParaRPr lang="en-US"/>
+          </a:p>
+        </p:txBody>
+      </p:sp>
+    </p:spTree>
+    <p:extLst>
+      <p:ext uri="{BB962C8B-B14F-4D97-AF65-F5344CB8AC3E}">
+        <p14:creationId xmlns:p14="http://schemas.microsoft.com/office/powerpoint/2010/main" val="3348761802"/>
+      </p:ext>
+    </p:extLst>
+  </p:cSld>
+  <p:clrMapOvr>
+    <a:masterClrMapping/>
+  </p:clrMapOvr>
+</p:notes>
+</file>
+
+<file path=ppt/notesSlides/notesSlide2.xml><?xml version="1.0" encoding="utf-8"?>
+<p:notes xmlns:a="http://schemas.openxmlformats.org/drawingml/2006/main" xmlns:r="http://schemas.openxmlformats.org/officeDocument/2006/relationships" xmlns:p="http://schemas.openxmlformats.org/presentationml/2006/main">
+  <p:cSld>
+    <p:spTree>
+      <p:nvGrpSpPr>
+        <p:cNvPr id="1" name=""/>
+        <p:cNvGrpSpPr/>
+        <p:nvPr/>
+      </p:nvGrpSpPr>
+      <p:grpSpPr>
+        <a:xfrm>
+          <a:off x="0" y="0"/>
+          <a:ext cx="0" cy="0"/>
+          <a:chOff x="0" y="0"/>
+          <a:chExt cx="0" cy="0"/>
+        </a:xfrm>
+      </p:grpSpPr>
+      <p:sp>
+        <p:nvSpPr>
+          <p:cNvPr id="2" name="Slide Image Placeholder 1"/>
+          <p:cNvSpPr>
+            <a:spLocks noGrp="1" noRot="1" noChangeAspect="1"/>
+          </p:cNvSpPr>
+          <p:nvPr>
+            <p:ph type="sldImg"/>
+          </p:nvPr>
+        </p:nvSpPr>
+        <p:spPr/>
+      </p:sp>
+      <p:sp>
+        <p:nvSpPr>
+          <p:cNvPr id="3" name="Notes Placeholder 2"/>
+          <p:cNvSpPr>
+            <a:spLocks noGrp="1"/>
+          </p:cNvSpPr>
+          <p:nvPr>
+            <p:ph type="body" idx="1"/>
+          </p:nvPr>
+        </p:nvSpPr>
+        <p:spPr/>
+        <p:txBody>
+          <a:bodyPr/>
+          <a:lstStyle/>
+          <a:p>
+            <a:r>
+              <a:rPr lang="en-US" dirty="0"/>
+              <a:t>Minecraft has a server-client architecture. Servers host multiple clients. In general, there are many modified servers (some official, some not) that host a variety of multi-user worlds. Clients can be </a:t>
+            </a:r>
+            <a:r>
+              <a:rPr lang="en-US" dirty="0" err="1"/>
+              <a:t>modded</a:t>
+            </a:r>
+            <a:r>
+              <a:rPr lang="en-US" dirty="0"/>
+              <a:t>, but most servers try to allow only official, unmodified clients.</a:t>
+            </a:r>
+          </a:p>
+          <a:p>
+            <a:endParaRPr lang="en-US" dirty="0"/>
+          </a:p>
+          <a:p>
+            <a:r>
+              <a:rPr lang="en-US" dirty="0"/>
+              <a:t>While it would be great for the classroom to share a single world, that requires a server setup in the classroom—a challenge to implement and a challenge to get the school IT staff to allow. This course uses standalone clients, which keeps things simple.</a:t>
+            </a:r>
+          </a:p>
+        </p:txBody>
+      </p:sp>
+      <p:sp>
+        <p:nvSpPr>
+          <p:cNvPr id="4" name="Slide Number Placeholder 3"/>
+          <p:cNvSpPr>
+            <a:spLocks noGrp="1"/>
+          </p:cNvSpPr>
+          <p:nvPr>
+            <p:ph type="sldNum" sz="quarter" idx="10"/>
+          </p:nvPr>
+        </p:nvSpPr>
+        <p:spPr/>
+        <p:txBody>
+          <a:bodyPr/>
+          <a:lstStyle/>
+          <a:p>
+            <a:fld id="{20BEAC3D-4815-4450-806D-C5E8D961EB40}" type="slidenum">
+              <a:rPr lang="en-US" smtClean="0"/>
+              <a:t>2</a:t>
+            </a:fld>
+            <a:endParaRPr lang="en-US"/>
+          </a:p>
+        </p:txBody>
+      </p:sp>
+    </p:spTree>
+    <p:extLst>
+      <p:ext uri="{BB962C8B-B14F-4D97-AF65-F5344CB8AC3E}">
+        <p14:creationId xmlns:p14="http://schemas.microsoft.com/office/powerpoint/2010/main" val="3380875829"/>
+      </p:ext>
+    </p:extLst>
+  </p:cSld>
+  <p:clrMapOvr>
+    <a:masterClrMapping/>
+  </p:clrMapOvr>
+</p:notes>
+</file>
+
+<file path=ppt/notesSlides/notesSlide3.xml><?xml version="1.0" encoding="utf-8"?>
+<p:notes xmlns:a="http://schemas.openxmlformats.org/drawingml/2006/main" xmlns:r="http://schemas.openxmlformats.org/officeDocument/2006/relationships" xmlns:p="http://schemas.openxmlformats.org/presentationml/2006/main">
+  <p:cSld>
+    <p:spTree>
+      <p:nvGrpSpPr>
+        <p:cNvPr id="1" name=""/>
+        <p:cNvGrpSpPr/>
+        <p:nvPr/>
+      </p:nvGrpSpPr>
+      <p:grpSpPr>
+        <a:xfrm>
+          <a:off x="0" y="0"/>
+          <a:ext cx="0" cy="0"/>
+          <a:chOff x="0" y="0"/>
+          <a:chExt cx="0" cy="0"/>
+        </a:xfrm>
+      </p:grpSpPr>
+      <p:sp>
+        <p:nvSpPr>
+          <p:cNvPr id="2" name="Slide Image Placeholder 1"/>
+          <p:cNvSpPr>
+            <a:spLocks noGrp="1" noRot="1" noChangeAspect="1"/>
+          </p:cNvSpPr>
+          <p:nvPr>
+            <p:ph type="sldImg"/>
+          </p:nvPr>
+        </p:nvSpPr>
+        <p:spPr/>
+      </p:sp>
+      <p:sp>
+        <p:nvSpPr>
+          <p:cNvPr id="3" name="Notes Placeholder 2"/>
+          <p:cNvSpPr>
+            <a:spLocks noGrp="1"/>
+          </p:cNvSpPr>
+          <p:nvPr>
+            <p:ph type="body" idx="1"/>
+          </p:nvPr>
+        </p:nvSpPr>
+        <p:spPr/>
+        <p:txBody>
+          <a:bodyPr/>
+          <a:lstStyle/>
+          <a:p>
+            <a:r>
+              <a:rPr lang="en-US" dirty="0"/>
+              <a:t>These three items—items, blocks, and entities—are what the Minecraft Modding Project focuses on. Students will create code for each of these three types of objects.</a:t>
+            </a:r>
+          </a:p>
+        </p:txBody>
+      </p:sp>
+      <p:sp>
+        <p:nvSpPr>
+          <p:cNvPr id="4" name="Slide Number Placeholder 3"/>
+          <p:cNvSpPr>
+            <a:spLocks noGrp="1"/>
+          </p:cNvSpPr>
+          <p:nvPr>
+            <p:ph type="sldNum" sz="quarter" idx="10"/>
+          </p:nvPr>
+        </p:nvSpPr>
+        <p:spPr/>
+        <p:txBody>
+          <a:bodyPr/>
+          <a:lstStyle/>
+          <a:p>
+            <a:fld id="{20BEAC3D-4815-4450-806D-C5E8D961EB40}" type="slidenum">
+              <a:rPr lang="en-US" smtClean="0"/>
+              <a:t>3</a:t>
+            </a:fld>
+            <a:endParaRPr lang="en-US"/>
+          </a:p>
+        </p:txBody>
+      </p:sp>
+    </p:spTree>
+    <p:extLst>
+      <p:ext uri="{BB962C8B-B14F-4D97-AF65-F5344CB8AC3E}">
+        <p14:creationId xmlns:p14="http://schemas.microsoft.com/office/powerpoint/2010/main" val="2304108894"/>
+      </p:ext>
+    </p:extLst>
+  </p:cSld>
+  <p:clrMapOvr>
+    <a:masterClrMapping/>
+  </p:clrMapOvr>
+</p:notes>
+</file>
+
+<file path=ppt/notesSlides/notesSlide4.xml><?xml version="1.0" encoding="utf-8"?>
+<p:notes xmlns:a="http://schemas.openxmlformats.org/drawingml/2006/main" xmlns:r="http://schemas.openxmlformats.org/officeDocument/2006/relationships" xmlns:p="http://schemas.openxmlformats.org/presentationml/2006/main">
+  <p:cSld>
+    <p:spTree>
+      <p:nvGrpSpPr>
+        <p:cNvPr id="1" name=""/>
+        <p:cNvGrpSpPr/>
+        <p:nvPr/>
+      </p:nvGrpSpPr>
+      <p:grpSpPr>
+        <a:xfrm>
+          <a:off x="0" y="0"/>
+          <a:ext cx="0" cy="0"/>
+          <a:chOff x="0" y="0"/>
+          <a:chExt cx="0" cy="0"/>
+        </a:xfrm>
+      </p:grpSpPr>
+      <p:sp>
+        <p:nvSpPr>
+          <p:cNvPr id="2" name="Slide Image Placeholder 1"/>
+          <p:cNvSpPr>
+            <a:spLocks noGrp="1" noRot="1" noChangeAspect="1"/>
+          </p:cNvSpPr>
+          <p:nvPr>
+            <p:ph type="sldImg"/>
+          </p:nvPr>
+        </p:nvSpPr>
+        <p:spPr/>
+      </p:sp>
+      <p:sp>
+        <p:nvSpPr>
+          <p:cNvPr id="3" name="Notes Placeholder 2"/>
+          <p:cNvSpPr>
+            <a:spLocks noGrp="1"/>
+          </p:cNvSpPr>
+          <p:nvPr>
+            <p:ph type="body" idx="1"/>
+          </p:nvPr>
+        </p:nvSpPr>
+        <p:spPr/>
+        <p:txBody>
+          <a:bodyPr/>
+          <a:lstStyle/>
+          <a:p>
+            <a:r>
+              <a:rPr lang="en-US" dirty="0"/>
+              <a:t>These are the simplest kind of items. We will start here and spend a single lab on creating new item types.</a:t>
+            </a:r>
+          </a:p>
+        </p:txBody>
+      </p:sp>
+      <p:sp>
+        <p:nvSpPr>
+          <p:cNvPr id="4" name="Slide Number Placeholder 3"/>
+          <p:cNvSpPr>
+            <a:spLocks noGrp="1"/>
+          </p:cNvSpPr>
+          <p:nvPr>
+            <p:ph type="sldNum" sz="quarter" idx="10"/>
+          </p:nvPr>
+        </p:nvSpPr>
+        <p:spPr/>
+        <p:txBody>
+          <a:bodyPr/>
+          <a:lstStyle/>
+          <a:p>
+            <a:fld id="{20BEAC3D-4815-4450-806D-C5E8D961EB40}" type="slidenum">
+              <a:rPr lang="en-US" smtClean="0"/>
+              <a:t>4</a:t>
+            </a:fld>
+            <a:endParaRPr lang="en-US"/>
+          </a:p>
+        </p:txBody>
+      </p:sp>
+    </p:spTree>
+    <p:extLst>
+      <p:ext uri="{BB962C8B-B14F-4D97-AF65-F5344CB8AC3E}">
+        <p14:creationId xmlns:p14="http://schemas.microsoft.com/office/powerpoint/2010/main" val="4032352038"/>
+      </p:ext>
+    </p:extLst>
+  </p:cSld>
+  <p:clrMapOvr>
+    <a:masterClrMapping/>
+  </p:clrMapOvr>
+</p:notes>
+</file>
+
+<file path=ppt/notesSlides/notesSlide5.xml><?xml version="1.0" encoding="utf-8"?>
+<p:notes xmlns:a="http://schemas.openxmlformats.org/drawingml/2006/main" xmlns:r="http://schemas.openxmlformats.org/officeDocument/2006/relationships" xmlns:p="http://schemas.openxmlformats.org/presentationml/2006/main">
+  <p:cSld>
+    <p:spTree>
+      <p:nvGrpSpPr>
+        <p:cNvPr id="1" name=""/>
+        <p:cNvGrpSpPr/>
+        <p:nvPr/>
+      </p:nvGrpSpPr>
+      <p:grpSpPr>
+        <a:xfrm>
+          <a:off x="0" y="0"/>
+          <a:ext cx="0" cy="0"/>
+          <a:chOff x="0" y="0"/>
+          <a:chExt cx="0" cy="0"/>
+        </a:xfrm>
+      </p:grpSpPr>
+      <p:sp>
+        <p:nvSpPr>
+          <p:cNvPr id="2" name="Slide Image Placeholder 1"/>
+          <p:cNvSpPr>
+            <a:spLocks noGrp="1" noRot="1" noChangeAspect="1"/>
+          </p:cNvSpPr>
+          <p:nvPr>
+            <p:ph type="sldImg"/>
+          </p:nvPr>
+        </p:nvSpPr>
+        <p:spPr/>
+      </p:sp>
+      <p:sp>
+        <p:nvSpPr>
+          <p:cNvPr id="3" name="Notes Placeholder 2"/>
+          <p:cNvSpPr>
+            <a:spLocks noGrp="1"/>
+          </p:cNvSpPr>
+          <p:nvPr>
+            <p:ph type="body" idx="1"/>
+          </p:nvPr>
+        </p:nvSpPr>
+        <p:spPr/>
+        <p:txBody>
+          <a:bodyPr/>
+          <a:lstStyle/>
+          <a:p>
+            <a:r>
+              <a:rPr lang="en-US" dirty="0"/>
+              <a:t>Blocks are more complicated than items, and allow for greater variety and programming capabilities. Blocks are addressed in three different labs of increasing complexity.</a:t>
+            </a:r>
+          </a:p>
+        </p:txBody>
+      </p:sp>
+      <p:sp>
+        <p:nvSpPr>
+          <p:cNvPr id="4" name="Slide Number Placeholder 3"/>
+          <p:cNvSpPr>
+            <a:spLocks noGrp="1"/>
+          </p:cNvSpPr>
+          <p:nvPr>
+            <p:ph type="sldNum" sz="quarter" idx="10"/>
+          </p:nvPr>
+        </p:nvSpPr>
+        <p:spPr/>
+        <p:txBody>
+          <a:bodyPr/>
+          <a:lstStyle/>
+          <a:p>
+            <a:fld id="{20BEAC3D-4815-4450-806D-C5E8D961EB40}" type="slidenum">
+              <a:rPr lang="en-US" smtClean="0"/>
+              <a:t>5</a:t>
+            </a:fld>
+            <a:endParaRPr lang="en-US"/>
+          </a:p>
+        </p:txBody>
+      </p:sp>
+    </p:spTree>
+    <p:extLst>
+      <p:ext uri="{BB962C8B-B14F-4D97-AF65-F5344CB8AC3E}">
+        <p14:creationId xmlns:p14="http://schemas.microsoft.com/office/powerpoint/2010/main" val="2667153570"/>
+      </p:ext>
+    </p:extLst>
+  </p:cSld>
+  <p:clrMapOvr>
+    <a:masterClrMapping/>
+  </p:clrMapOvr>
+</p:notes>
+</file>
+
+<file path=ppt/notesSlides/notesSlide6.xml><?xml version="1.0" encoding="utf-8"?>
+<p:notes xmlns:a="http://schemas.openxmlformats.org/drawingml/2006/main" xmlns:r="http://schemas.openxmlformats.org/officeDocument/2006/relationships" xmlns:p="http://schemas.openxmlformats.org/presentationml/2006/main">
+  <p:cSld>
+    <p:spTree>
+      <p:nvGrpSpPr>
+        <p:cNvPr id="1" name=""/>
+        <p:cNvGrpSpPr/>
+        <p:nvPr/>
+      </p:nvGrpSpPr>
+      <p:grpSpPr>
+        <a:xfrm>
+          <a:off x="0" y="0"/>
+          <a:ext cx="0" cy="0"/>
+          <a:chOff x="0" y="0"/>
+          <a:chExt cx="0" cy="0"/>
+        </a:xfrm>
+      </p:grpSpPr>
+      <p:sp>
+        <p:nvSpPr>
+          <p:cNvPr id="2" name="Slide Image Placeholder 1"/>
+          <p:cNvSpPr>
+            <a:spLocks noGrp="1" noRot="1" noChangeAspect="1"/>
+          </p:cNvSpPr>
+          <p:nvPr>
+            <p:ph type="sldImg"/>
+          </p:nvPr>
+        </p:nvSpPr>
+        <p:spPr/>
+      </p:sp>
+      <p:sp>
+        <p:nvSpPr>
+          <p:cNvPr id="3" name="Notes Placeholder 2"/>
+          <p:cNvSpPr>
+            <a:spLocks noGrp="1"/>
+          </p:cNvSpPr>
+          <p:nvPr>
+            <p:ph type="body" idx="1"/>
+          </p:nvPr>
+        </p:nvSpPr>
+        <p:spPr/>
+        <p:txBody>
+          <a:bodyPr/>
+          <a:lstStyle/>
+          <a:p>
+            <a:r>
+              <a:rPr lang="en-US" dirty="0"/>
+              <a:t>Entities are the most complicated and powerful objects. Entities in this project are all variants of `Robot` entities, which come with a number of useful interfaces. These allow students a lot of flexibility to create cool creatures without getting bogged down in details. Entities are covered in four of the labs.</a:t>
+            </a:r>
+          </a:p>
+        </p:txBody>
+      </p:sp>
+      <p:sp>
+        <p:nvSpPr>
+          <p:cNvPr id="4" name="Slide Number Placeholder 3"/>
+          <p:cNvSpPr>
+            <a:spLocks noGrp="1"/>
+          </p:cNvSpPr>
+          <p:nvPr>
+            <p:ph type="sldNum" sz="quarter" idx="10"/>
+          </p:nvPr>
+        </p:nvSpPr>
+        <p:spPr/>
+        <p:txBody>
+          <a:bodyPr/>
+          <a:lstStyle/>
+          <a:p>
+            <a:fld id="{20BEAC3D-4815-4450-806D-C5E8D961EB40}" type="slidenum">
+              <a:rPr lang="en-US" smtClean="0"/>
+              <a:t>6</a:t>
+            </a:fld>
+            <a:endParaRPr lang="en-US"/>
+          </a:p>
+        </p:txBody>
+      </p:sp>
+    </p:spTree>
+    <p:extLst>
+      <p:ext uri="{BB962C8B-B14F-4D97-AF65-F5344CB8AC3E}">
+        <p14:creationId xmlns:p14="http://schemas.microsoft.com/office/powerpoint/2010/main" val="1838750506"/>
+      </p:ext>
+    </p:extLst>
+  </p:cSld>
+  <p:clrMapOvr>
+    <a:masterClrMapping/>
+  </p:clrMapOvr>
+</p:notes>
+</file>
+
+<file path=ppt/notesSlides/notesSlide7.xml><?xml version="1.0" encoding="utf-8"?>
+<p:notes xmlns:a="http://schemas.openxmlformats.org/drawingml/2006/main" xmlns:r="http://schemas.openxmlformats.org/officeDocument/2006/relationships" xmlns:p="http://schemas.openxmlformats.org/presentationml/2006/main">
+  <p:cSld>
+    <p:spTree>
+      <p:nvGrpSpPr>
+        <p:cNvPr id="1" name=""/>
+        <p:cNvGrpSpPr/>
+        <p:nvPr/>
+      </p:nvGrpSpPr>
+      <p:grpSpPr>
+        <a:xfrm>
+          <a:off x="0" y="0"/>
+          <a:ext cx="0" cy="0"/>
+          <a:chOff x="0" y="0"/>
+          <a:chExt cx="0" cy="0"/>
+        </a:xfrm>
+      </p:grpSpPr>
+      <p:sp>
+        <p:nvSpPr>
+          <p:cNvPr id="2" name="Slide Image Placeholder 1"/>
+          <p:cNvSpPr>
+            <a:spLocks noGrp="1" noRot="1" noChangeAspect="1"/>
+          </p:cNvSpPr>
+          <p:nvPr>
+            <p:ph type="sldImg"/>
+          </p:nvPr>
+        </p:nvSpPr>
+        <p:spPr/>
+      </p:sp>
+      <p:sp>
+        <p:nvSpPr>
+          <p:cNvPr id="3" name="Notes Placeholder 2"/>
+          <p:cNvSpPr>
+            <a:spLocks noGrp="1"/>
+          </p:cNvSpPr>
+          <p:nvPr>
+            <p:ph type="body" idx="1"/>
+          </p:nvPr>
+        </p:nvSpPr>
+        <p:spPr/>
+        <p:txBody>
+          <a:bodyPr/>
+          <a:lstStyle/>
+          <a:p>
+            <a:endParaRPr lang="en-US" dirty="0"/>
+          </a:p>
+        </p:txBody>
+      </p:sp>
+      <p:sp>
+        <p:nvSpPr>
+          <p:cNvPr id="4" name="Slide Number Placeholder 3"/>
+          <p:cNvSpPr>
+            <a:spLocks noGrp="1"/>
+          </p:cNvSpPr>
+          <p:nvPr>
+            <p:ph type="sldNum" sz="quarter" idx="10"/>
+          </p:nvPr>
+        </p:nvSpPr>
+        <p:spPr/>
+        <p:txBody>
+          <a:bodyPr/>
+          <a:lstStyle/>
+          <a:p>
+            <a:fld id="{20BEAC3D-4815-4450-806D-C5E8D961EB40}" type="slidenum">
+              <a:rPr lang="en-US" smtClean="0"/>
+              <a:t>7</a:t>
+            </a:fld>
+            <a:endParaRPr lang="en-US"/>
+          </a:p>
+        </p:txBody>
+      </p:sp>
+    </p:spTree>
+    <p:extLst>
+      <p:ext uri="{BB962C8B-B14F-4D97-AF65-F5344CB8AC3E}">
+        <p14:creationId xmlns:p14="http://schemas.microsoft.com/office/powerpoint/2010/main" val="2774156532"/>
+      </p:ext>
+    </p:extLst>
+  </p:cSld>
+  <p:clrMapOvr>
+    <a:masterClrMapping/>
+  </p:clrMapOvr>
+</p:notes>
+</file>
+
+<file path=ppt/notesSlides/notesSlide8.xml><?xml version="1.0" encoding="utf-8"?>
+<p:notes xmlns:a="http://schemas.openxmlformats.org/drawingml/2006/main" xmlns:r="http://schemas.openxmlformats.org/officeDocument/2006/relationships" xmlns:p="http://schemas.openxmlformats.org/presentationml/2006/main">
+  <p:cSld>
+    <p:spTree>
+      <p:nvGrpSpPr>
+        <p:cNvPr id="1" name=""/>
+        <p:cNvGrpSpPr/>
+        <p:nvPr/>
+      </p:nvGrpSpPr>
+      <p:grpSpPr>
+        <a:xfrm>
+          <a:off x="0" y="0"/>
+          <a:ext cx="0" cy="0"/>
+          <a:chOff x="0" y="0"/>
+          <a:chExt cx="0" cy="0"/>
+        </a:xfrm>
+      </p:grpSpPr>
+      <p:sp>
+        <p:nvSpPr>
+          <p:cNvPr id="2" name="Slide Image Placeholder 1"/>
+          <p:cNvSpPr>
+            <a:spLocks noGrp="1" noRot="1" noChangeAspect="1"/>
+          </p:cNvSpPr>
+          <p:nvPr>
+            <p:ph type="sldImg"/>
+          </p:nvPr>
+        </p:nvSpPr>
+        <p:spPr/>
+      </p:sp>
+      <p:sp>
+        <p:nvSpPr>
+          <p:cNvPr id="3" name="Notes Placeholder 2"/>
+          <p:cNvSpPr>
+            <a:spLocks noGrp="1"/>
+          </p:cNvSpPr>
+          <p:nvPr>
+            <p:ph type="body" idx="1"/>
+          </p:nvPr>
+        </p:nvSpPr>
+        <p:spPr/>
+        <p:txBody>
+          <a:bodyPr/>
+          <a:lstStyle/>
+          <a:p>
+            <a:endParaRPr lang="en-US" dirty="0"/>
+          </a:p>
+        </p:txBody>
+      </p:sp>
+      <p:sp>
+        <p:nvSpPr>
+          <p:cNvPr id="4" name="Slide Number Placeholder 3"/>
+          <p:cNvSpPr>
+            <a:spLocks noGrp="1"/>
+          </p:cNvSpPr>
+          <p:nvPr>
+            <p:ph type="sldNum" sz="quarter" idx="10"/>
+          </p:nvPr>
+        </p:nvSpPr>
+        <p:spPr/>
+        <p:txBody>
+          <a:bodyPr/>
+          <a:lstStyle/>
+          <a:p>
+            <a:fld id="{20BEAC3D-4815-4450-806D-C5E8D961EB40}" type="slidenum">
+              <a:rPr lang="en-US" smtClean="0"/>
+              <a:t>8</a:t>
+            </a:fld>
+            <a:endParaRPr lang="en-US"/>
+          </a:p>
+        </p:txBody>
+      </p:sp>
+    </p:spTree>
+    <p:extLst>
+      <p:ext uri="{BB962C8B-B14F-4D97-AF65-F5344CB8AC3E}">
+        <p14:creationId xmlns:p14="http://schemas.microsoft.com/office/powerpoint/2010/main" val="181264057"/>
+      </p:ext>
+    </p:extLst>
+  </p:cSld>
+  <p:clrMapOvr>
+    <a:masterClrMapping/>
+  </p:clrMapOvr>
+</p:notes>
+</file>
+
+<file path=ppt/notesSlides/notesSlide9.xml><?xml version="1.0" encoding="utf-8"?>
+<p:notes xmlns:a="http://schemas.openxmlformats.org/drawingml/2006/main" xmlns:r="http://schemas.openxmlformats.org/officeDocument/2006/relationships" xmlns:p="http://schemas.openxmlformats.org/presentationml/2006/main">
+  <p:cSld>
+    <p:spTree>
+      <p:nvGrpSpPr>
+        <p:cNvPr id="1" name=""/>
+        <p:cNvGrpSpPr/>
+        <p:nvPr/>
+      </p:nvGrpSpPr>
+      <p:grpSpPr>
+        <a:xfrm>
+          <a:off x="0" y="0"/>
+          <a:ext cx="0" cy="0"/>
+          <a:chOff x="0" y="0"/>
+          <a:chExt cx="0" cy="0"/>
+        </a:xfrm>
+      </p:grpSpPr>
+      <p:sp>
+        <p:nvSpPr>
+          <p:cNvPr id="2" name="Slide Image Placeholder 1"/>
+          <p:cNvSpPr>
+            <a:spLocks noGrp="1" noRot="1" noChangeAspect="1"/>
+          </p:cNvSpPr>
+          <p:nvPr>
+            <p:ph type="sldImg"/>
+          </p:nvPr>
+        </p:nvSpPr>
+        <p:spPr/>
+      </p:sp>
+      <p:sp>
+        <p:nvSpPr>
+          <p:cNvPr id="3" name="Notes Placeholder 2"/>
+          <p:cNvSpPr>
+            <a:spLocks noGrp="1"/>
+          </p:cNvSpPr>
+          <p:nvPr>
+            <p:ph type="body" idx="1"/>
+          </p:nvPr>
+        </p:nvSpPr>
+        <p:spPr/>
+        <p:txBody>
+          <a:bodyPr/>
+          <a:lstStyle/>
+          <a:p>
+            <a:r>
+              <a:rPr lang="en-US" dirty="0"/>
+              <a:t>We have a demo script that is fairly simple to set up and run to show this. Source code is available on GitHub in the `</a:t>
+            </a:r>
+            <a:r>
+              <a:rPr lang="en-US" dirty="0" err="1"/>
+              <a:t>apcsa</a:t>
+            </a:r>
+            <a:r>
+              <a:rPr lang="en-US" dirty="0"/>
+              <a:t>` repository, under `projects/minecraft/demo`.</a:t>
+            </a:r>
+          </a:p>
+        </p:txBody>
+      </p:sp>
+      <p:sp>
+        <p:nvSpPr>
+          <p:cNvPr id="4" name="Slide Number Placeholder 3"/>
+          <p:cNvSpPr>
+            <a:spLocks noGrp="1"/>
+          </p:cNvSpPr>
+          <p:nvPr>
+            <p:ph type="sldNum" sz="quarter" idx="10"/>
+          </p:nvPr>
+        </p:nvSpPr>
+        <p:spPr/>
+        <p:txBody>
+          <a:bodyPr/>
+          <a:lstStyle/>
+          <a:p>
+            <a:fld id="{20BEAC3D-4815-4450-806D-C5E8D961EB40}" type="slidenum">
+              <a:rPr lang="en-US" smtClean="0"/>
+              <a:t>9</a:t>
+            </a:fld>
+            <a:endParaRPr lang="en-US"/>
+          </a:p>
+        </p:txBody>
+      </p:sp>
+    </p:spTree>
+    <p:extLst>
+      <p:ext uri="{BB962C8B-B14F-4D97-AF65-F5344CB8AC3E}">
+        <p14:creationId xmlns:p14="http://schemas.microsoft.com/office/powerpoint/2010/main" val="2698710924"/>
+      </p:ext>
+    </p:extLst>
+  </p:cSld>
+  <p:clrMapOvr>
+    <a:masterClrMapping/>
+  </p:clrMapOvr>
+</p:notes>
+</file>
+
 <file path=ppt/slideLayouts/slideLayout1.xml><?xml version="1.0" encoding="utf-8"?>
 <p:sldLayout xmlns:a="http://schemas.openxmlformats.org/drawingml/2006/main" xmlns:r="http://schemas.openxmlformats.org/officeDocument/2006/relationships" xmlns:p="http://schemas.openxmlformats.org/presentationml/2006/main" showMasterSp="0" type="title" preserve="1">
   <p:cSld name="Title Slide">
@@ -786,7 +1757,7 @@
           <a:p>
             <a:fld id="{BD4101FD-5CF6-4E3D-BF36-722322E10D3E}" type="datetimeFigureOut">
               <a:rPr lang="en-US" smtClean="0"/>
-              <a:t>2017-04-22</a:t>
+              <a:t>2017-05-03</a:t>
             </a:fld>
             <a:endParaRPr lang="en-US"/>
           </a:p>
@@ -972,7 +1943,7 @@
           <a:p>
             <a:fld id="{BD4101FD-5CF6-4E3D-BF36-722322E10D3E}" type="datetimeFigureOut">
               <a:rPr lang="en-US" smtClean="0"/>
-              <a:t>2017-04-22</a:t>
+              <a:t>2017-05-03</a:t>
             </a:fld>
             <a:endParaRPr lang="en-US"/>
           </a:p>
@@ -1195,7 +2166,7 @@
           <a:p>
             <a:fld id="{BD4101FD-5CF6-4E3D-BF36-722322E10D3E}" type="datetimeFigureOut">
               <a:rPr lang="en-US" smtClean="0"/>
-              <a:t>2017-04-22</a:t>
+              <a:t>2017-05-03</a:t>
             </a:fld>
             <a:endParaRPr lang="en-US"/>
           </a:p>
@@ -1375,7 +2346,7 @@
           <a:p>
             <a:fld id="{BD4101FD-5CF6-4E3D-BF36-722322E10D3E}" type="datetimeFigureOut">
               <a:rPr lang="en-US" smtClean="0"/>
-              <a:t>2017-04-22</a:t>
+              <a:t>2017-05-03</a:t>
             </a:fld>
             <a:endParaRPr lang="en-US"/>
           </a:p>
@@ -1714,7 +2685,7 @@
           <a:p>
             <a:fld id="{BD4101FD-5CF6-4E3D-BF36-722322E10D3E}" type="datetimeFigureOut">
               <a:rPr lang="en-US" smtClean="0"/>
-              <a:t>2017-04-22</a:t>
+              <a:t>2017-05-03</a:t>
             </a:fld>
             <a:endParaRPr lang="en-US"/>
           </a:p>
@@ -2018,7 +2989,7 @@
           <a:p>
             <a:fld id="{BD4101FD-5CF6-4E3D-BF36-722322E10D3E}" type="datetimeFigureOut">
               <a:rPr lang="en-US" smtClean="0"/>
-              <a:t>2017-04-22</a:t>
+              <a:t>2017-05-03</a:t>
             </a:fld>
             <a:endParaRPr lang="en-US"/>
           </a:p>
@@ -2440,7 +3411,7 @@
           <a:p>
             <a:fld id="{BD4101FD-5CF6-4E3D-BF36-722322E10D3E}" type="datetimeFigureOut">
               <a:rPr lang="en-US" smtClean="0"/>
-              <a:t>2017-04-22</a:t>
+              <a:t>2017-05-03</a:t>
             </a:fld>
             <a:endParaRPr lang="en-US"/>
           </a:p>
@@ -2558,7 +3529,7 @@
           <a:p>
             <a:fld id="{BD4101FD-5CF6-4E3D-BF36-722322E10D3E}" type="datetimeFigureOut">
               <a:rPr lang="en-US" smtClean="0"/>
-              <a:t>2017-04-22</a:t>
+              <a:t>2017-05-03</a:t>
             </a:fld>
             <a:endParaRPr lang="en-US"/>
           </a:p>
@@ -2653,7 +3624,7 @@
           <a:p>
             <a:fld id="{BD4101FD-5CF6-4E3D-BF36-722322E10D3E}" type="datetimeFigureOut">
               <a:rPr lang="en-US" smtClean="0"/>
-              <a:t>2017-04-22</a:t>
+              <a:t>2017-05-03</a:t>
             </a:fld>
             <a:endParaRPr lang="en-US"/>
           </a:p>
@@ -2926,7 +3897,7 @@
           <a:p>
             <a:fld id="{BD4101FD-5CF6-4E3D-BF36-722322E10D3E}" type="datetimeFigureOut">
               <a:rPr lang="en-US" smtClean="0"/>
-              <a:t>2017-04-22</a:t>
+              <a:t>2017-05-03</a:t>
             </a:fld>
             <a:endParaRPr lang="en-US"/>
           </a:p>
@@ -3191,7 +4162,7 @@
           <a:p>
             <a:fld id="{BD4101FD-5CF6-4E3D-BF36-722322E10D3E}" type="datetimeFigureOut">
               <a:rPr lang="en-US" smtClean="0"/>
-              <a:t>2017-04-22</a:t>
+              <a:t>2017-05-03</a:t>
             </a:fld>
             <a:endParaRPr lang="en-US"/>
           </a:p>
@@ -3440,7 +4411,7 @@
           <a:p>
             <a:fld id="{BD4101FD-5CF6-4E3D-BF36-722322E10D3E}" type="datetimeFigureOut">
               <a:rPr lang="en-US" smtClean="0"/>
-              <a:t>2017-04-22</a:t>
+              <a:t>2017-05-03</a:t>
             </a:fld>
             <a:endParaRPr lang="en-US"/>
           </a:p>
@@ -4537,7 +5508,7 @@
           <p:nvPr/>
         </p:nvPicPr>
         <p:blipFill>
-          <a:blip r:embed="rId2"/>
+          <a:blip r:embed="rId3"/>
           <a:stretch>
             <a:fillRect/>
           </a:stretch>
@@ -4700,7 +5671,7 @@
           <p:nvPr/>
         </p:nvPicPr>
         <p:blipFill>
-          <a:blip r:embed="rId2">
+          <a:blip r:embed="rId3">
             <a:extLst>
               <a:ext uri="{28A0092B-C50C-407E-A947-70E740481C1C}">
                 <a14:useLocalDpi xmlns:a14="http://schemas.microsoft.com/office/drawing/2010/main" val="0"/>
@@ -4734,7 +5705,7 @@
       </p:pic>
       <mc:AlternateContent xmlns:mc="http://schemas.openxmlformats.org/markup-compatibility/2006" xmlns:p14="http://schemas.microsoft.com/office/powerpoint/2010/main">
         <mc:Choice Requires="p14">
-          <p:contentPart p14:bwMode="auto" r:id="rId3">
+          <p:contentPart p14:bwMode="auto" r:id="rId4">
             <p14:nvContentPartPr>
               <p14:cNvPr id="7" name="Ink 6"/>
               <p14:cNvContentPartPr/>
@@ -4754,7 +5725,7 @@
               <p:nvPr/>
             </p:nvPicPr>
             <p:blipFill>
-              <a:blip r:embed="rId4"/>
+              <a:blip r:embed="rId5"/>
               <a:stretch>
                 <a:fillRect/>
               </a:stretch>
@@ -4888,7 +5859,7 @@
           <p:nvPr/>
         </p:nvPicPr>
         <p:blipFill>
-          <a:blip r:embed="rId2">
+          <a:blip r:embed="rId3">
             <a:extLst>
               <a:ext uri="{28A0092B-C50C-407E-A947-70E740481C1C}">
                 <a14:useLocalDpi xmlns:a14="http://schemas.microsoft.com/office/drawing/2010/main" val="0"/>
@@ -5037,7 +6008,7 @@
           <p:nvPr/>
         </p:nvPicPr>
         <p:blipFill>
-          <a:blip r:embed="rId2">
+          <a:blip r:embed="rId3">
             <a:extLst>
               <a:ext uri="{28A0092B-C50C-407E-A947-70E740481C1C}">
                 <a14:useLocalDpi xmlns:a14="http://schemas.microsoft.com/office/drawing/2010/main" val="0"/>
@@ -5182,7 +6153,7 @@
           <p:nvPr/>
         </p:nvPicPr>
         <p:blipFill>
-          <a:blip r:embed="rId2">
+          <a:blip r:embed="rId3">
             <a:extLst>
               <a:ext uri="{28A0092B-C50C-407E-A947-70E740481C1C}">
                 <a14:useLocalDpi xmlns:a14="http://schemas.microsoft.com/office/drawing/2010/main" val="0"/>
@@ -6129,4 +7100,299 @@
     </a:ext>
   </a:extLst>
 </a:theme>
+</file>
+
+<file path=ppt/theme/theme3.xml><?xml version="1.0" encoding="utf-8"?>
+<a:theme xmlns:a="http://schemas.openxmlformats.org/drawingml/2006/main" name="Office Theme">
+  <a:themeElements>
+    <a:clrScheme name="Office">
+      <a:dk1>
+        <a:sysClr val="windowText" lastClr="000000"/>
+      </a:dk1>
+      <a:lt1>
+        <a:sysClr val="window" lastClr="FFFFFF"/>
+      </a:lt1>
+      <a:dk2>
+        <a:srgbClr val="44546A"/>
+      </a:dk2>
+      <a:lt2>
+        <a:srgbClr val="E7E6E6"/>
+      </a:lt2>
+      <a:accent1>
+        <a:srgbClr val="4472C4"/>
+      </a:accent1>
+      <a:accent2>
+        <a:srgbClr val="ED7D31"/>
+      </a:accent2>
+      <a:accent3>
+        <a:srgbClr val="A5A5A5"/>
+      </a:accent3>
+      <a:accent4>
+        <a:srgbClr val="FFC000"/>
+      </a:accent4>
+      <a:accent5>
+        <a:srgbClr val="5B9BD5"/>
+      </a:accent5>
+      <a:accent6>
+        <a:srgbClr val="70AD47"/>
+      </a:accent6>
+      <a:hlink>
+        <a:srgbClr val="0563C1"/>
+      </a:hlink>
+      <a:folHlink>
+        <a:srgbClr val="954F72"/>
+      </a:folHlink>
+    </a:clrScheme>
+    <a:fontScheme name="Office">
+      <a:majorFont>
+        <a:latin typeface="Calibri Light" panose="020F0302020204030204"/>
+        <a:ea typeface=""/>
+        <a:cs typeface=""/>
+        <a:font script="Jpan" typeface="游ゴシック Light"/>
+        <a:font script="Hang" typeface="맑은 고딕"/>
+        <a:font script="Hans" typeface="等线 Light"/>
+        <a:font script="Hant" typeface="新細明體"/>
+        <a:font script="Arab" typeface="Times New Roman"/>
+        <a:font script="Hebr" typeface="Times New Roman"/>
+        <a:font script="Thai" typeface="Angsana New"/>
+        <a:font script="Ethi" typeface="Nyala"/>
+        <a:font script="Beng" typeface="Vrinda"/>
+        <a:font script="Gujr" typeface="Shruti"/>
+        <a:font script="Khmr" typeface="MoolBoran"/>
+        <a:font script="Knda" typeface="Tunga"/>
+        <a:font script="Guru" typeface="Raavi"/>
+        <a:font script="Cans" typeface="Euphemia"/>
+        <a:font script="Cher" typeface="Plantagenet Cherokee"/>
+        <a:font script="Yiii" typeface="Microsoft Yi Baiti"/>
+        <a:font script="Tibt" typeface="Microsoft Himalaya"/>
+        <a:font script="Thaa" typeface="MV Boli"/>
+        <a:font script="Deva" typeface="Mangal"/>
+        <a:font script="Telu" typeface="Gautami"/>
+        <a:font script="Taml" typeface="Latha"/>
+        <a:font script="Syrc" typeface="Estrangelo Edessa"/>
+        <a:font script="Orya" typeface="Kalinga"/>
+        <a:font script="Mlym" typeface="Kartika"/>
+        <a:font script="Laoo" typeface="DokChampa"/>
+        <a:font script="Sinh" typeface="Iskoola Pota"/>
+        <a:font script="Mong" typeface="Mongolian Baiti"/>
+        <a:font script="Viet" typeface="Times New Roman"/>
+        <a:font script="Uigh" typeface="Microsoft Uighur"/>
+        <a:font script="Geor" typeface="Sylfaen"/>
+        <a:font script="Armn" typeface="Arial"/>
+        <a:font script="Bugi" typeface="Leelawadee UI"/>
+        <a:font script="Bopo" typeface="Microsoft JhengHei"/>
+        <a:font script="Java" typeface="Javanese Text"/>
+        <a:font script="Lisu" typeface="Segoe UI"/>
+        <a:font script="Mymr" typeface="Myanmar Text"/>
+        <a:font script="Nkoo" typeface="Ebrima"/>
+        <a:font script="Olck" typeface="Nirmala UI"/>
+        <a:font script="Osma" typeface="Ebrima"/>
+        <a:font script="Phag" typeface="Phagspa"/>
+        <a:font script="Syrn" typeface="Estrangelo Edessa"/>
+        <a:font script="Syrj" typeface="Estrangelo Edessa"/>
+        <a:font script="Syre" typeface="Estrangelo Edessa"/>
+        <a:font script="Sora" typeface="Nirmala UI"/>
+        <a:font script="Tale" typeface="Microsoft Tai Le"/>
+        <a:font script="Talu" typeface="Microsoft New Tai Lue"/>
+        <a:font script="Tfng" typeface="Ebrima"/>
+      </a:majorFont>
+      <a:minorFont>
+        <a:latin typeface="Calibri" panose="020F0502020204030204"/>
+        <a:ea typeface=""/>
+        <a:cs typeface=""/>
+        <a:font script="Jpan" typeface="游ゴシック"/>
+        <a:font script="Hang" typeface="맑은 고딕"/>
+        <a:font script="Hans" typeface="等线"/>
+        <a:font script="Hant" typeface="新細明體"/>
+        <a:font script="Arab" typeface="Arial"/>
+        <a:font script="Hebr" typeface="Arial"/>
+        <a:font script="Thai" typeface="Cordia New"/>
+        <a:font script="Ethi" typeface="Nyala"/>
+        <a:font script="Beng" typeface="Vrinda"/>
+        <a:font script="Gujr" typeface="Shruti"/>
+        <a:font script="Khmr" typeface="DaunPenh"/>
+        <a:font script="Knda" typeface="Tunga"/>
+        <a:font script="Guru" typeface="Raavi"/>
+        <a:font script="Cans" typeface="Euphemia"/>
+        <a:font script="Cher" typeface="Plantagenet Cherokee"/>
+        <a:font script="Yiii" typeface="Microsoft Yi Baiti"/>
+        <a:font script="Tibt" typeface="Microsoft Himalaya"/>
+        <a:font script="Thaa" typeface="MV Boli"/>
+        <a:font script="Deva" typeface="Mangal"/>
+        <a:font script="Telu" typeface="Gautami"/>
+        <a:font script="Taml" typeface="Latha"/>
+        <a:font script="Syrc" typeface="Estrangelo Edessa"/>
+        <a:font script="Orya" typeface="Kalinga"/>
+        <a:font script="Mlym" typeface="Kartika"/>
+        <a:font script="Laoo" typeface="DokChampa"/>
+        <a:font script="Sinh" typeface="Iskoola Pota"/>
+        <a:font script="Mong" typeface="Mongolian Baiti"/>
+        <a:font script="Viet" typeface="Arial"/>
+        <a:font script="Uigh" typeface="Microsoft Uighur"/>
+        <a:font script="Geor" typeface="Sylfaen"/>
+        <a:font script="Armn" typeface="Arial"/>
+        <a:font script="Bugi" typeface="Leelawadee UI"/>
+        <a:font script="Bopo" typeface="Microsoft JhengHei"/>
+        <a:font script="Java" typeface="Javanese Text"/>
+        <a:font script="Lisu" typeface="Segoe UI"/>
+        <a:font script="Mymr" typeface="Myanmar Text"/>
+        <a:font script="Nkoo" typeface="Ebrima"/>
+        <a:font script="Olck" typeface="Nirmala UI"/>
+        <a:font script="Osma" typeface="Ebrima"/>
+        <a:font script="Phag" typeface="Phagspa"/>
+        <a:font script="Syrn" typeface="Estrangelo Edessa"/>
+        <a:font script="Syrj" typeface="Estrangelo Edessa"/>
+        <a:font script="Syre" typeface="Estrangelo Edessa"/>
+        <a:font script="Sora" typeface="Nirmala UI"/>
+        <a:font script="Tale" typeface="Microsoft Tai Le"/>
+        <a:font script="Talu" typeface="Microsoft New Tai Lue"/>
+        <a:font script="Tfng" typeface="Ebrima"/>
+      </a:minorFont>
+    </a:fontScheme>
+    <a:fmtScheme name="Office">
+      <a:fillStyleLst>
+        <a:solidFill>
+          <a:schemeClr val="phClr"/>
+        </a:solidFill>
+        <a:gradFill rotWithShape="1">
+          <a:gsLst>
+            <a:gs pos="0">
+              <a:schemeClr val="phClr">
+                <a:lumMod val="110000"/>
+                <a:satMod val="105000"/>
+                <a:tint val="67000"/>
+              </a:schemeClr>
+            </a:gs>
+            <a:gs pos="50000">
+              <a:schemeClr val="phClr">
+                <a:lumMod val="105000"/>
+                <a:satMod val="103000"/>
+                <a:tint val="73000"/>
+              </a:schemeClr>
+            </a:gs>
+            <a:gs pos="100000">
+              <a:schemeClr val="phClr">
+                <a:lumMod val="105000"/>
+                <a:satMod val="109000"/>
+                <a:tint val="81000"/>
+              </a:schemeClr>
+            </a:gs>
+          </a:gsLst>
+          <a:lin ang="5400000" scaled="0"/>
+        </a:gradFill>
+        <a:gradFill rotWithShape="1">
+          <a:gsLst>
+            <a:gs pos="0">
+              <a:schemeClr val="phClr">
+                <a:satMod val="103000"/>
+                <a:lumMod val="102000"/>
+                <a:tint val="94000"/>
+              </a:schemeClr>
+            </a:gs>
+            <a:gs pos="50000">
+              <a:schemeClr val="phClr">
+                <a:satMod val="110000"/>
+                <a:lumMod val="100000"/>
+                <a:shade val="100000"/>
+              </a:schemeClr>
+            </a:gs>
+            <a:gs pos="100000">
+              <a:schemeClr val="phClr">
+                <a:lumMod val="99000"/>
+                <a:satMod val="120000"/>
+                <a:shade val="78000"/>
+              </a:schemeClr>
+            </a:gs>
+          </a:gsLst>
+          <a:lin ang="5400000" scaled="0"/>
+        </a:gradFill>
+      </a:fillStyleLst>
+      <a:lnStyleLst>
+        <a:ln w="6350" cap="flat" cmpd="sng" algn="ctr">
+          <a:solidFill>
+            <a:schemeClr val="phClr"/>
+          </a:solidFill>
+          <a:prstDash val="solid"/>
+          <a:miter lim="800000"/>
+        </a:ln>
+        <a:ln w="12700" cap="flat" cmpd="sng" algn="ctr">
+          <a:solidFill>
+            <a:schemeClr val="phClr"/>
+          </a:solidFill>
+          <a:prstDash val="solid"/>
+          <a:miter lim="800000"/>
+        </a:ln>
+        <a:ln w="19050" cap="flat" cmpd="sng" algn="ctr">
+          <a:solidFill>
+            <a:schemeClr val="phClr"/>
+          </a:solidFill>
+          <a:prstDash val="solid"/>
+          <a:miter lim="800000"/>
+        </a:ln>
+      </a:lnStyleLst>
+      <a:effectStyleLst>
+        <a:effectStyle>
+          <a:effectLst/>
+        </a:effectStyle>
+        <a:effectStyle>
+          <a:effectLst/>
+        </a:effectStyle>
+        <a:effectStyle>
+          <a:effectLst>
+            <a:outerShdw blurRad="57150" dist="19050" dir="5400000" algn="ctr" rotWithShape="0">
+              <a:srgbClr val="000000">
+                <a:alpha val="63000"/>
+              </a:srgbClr>
+            </a:outerShdw>
+          </a:effectLst>
+        </a:effectStyle>
+      </a:effectStyleLst>
+      <a:bgFillStyleLst>
+        <a:solidFill>
+          <a:schemeClr val="phClr"/>
+        </a:solidFill>
+        <a:solidFill>
+          <a:schemeClr val="phClr">
+            <a:tint val="95000"/>
+            <a:satMod val="170000"/>
+          </a:schemeClr>
+        </a:solidFill>
+        <a:gradFill rotWithShape="1">
+          <a:gsLst>
+            <a:gs pos="0">
+              <a:schemeClr val="phClr">
+                <a:tint val="93000"/>
+                <a:satMod val="150000"/>
+                <a:shade val="98000"/>
+                <a:lumMod val="102000"/>
+              </a:schemeClr>
+            </a:gs>
+            <a:gs pos="50000">
+              <a:schemeClr val="phClr">
+                <a:tint val="98000"/>
+                <a:satMod val="130000"/>
+                <a:shade val="90000"/>
+                <a:lumMod val="103000"/>
+              </a:schemeClr>
+            </a:gs>
+            <a:gs pos="100000">
+              <a:schemeClr val="phClr">
+                <a:shade val="63000"/>
+                <a:satMod val="120000"/>
+              </a:schemeClr>
+            </a:gs>
+          </a:gsLst>
+          <a:lin ang="5400000" scaled="0"/>
+        </a:gradFill>
+      </a:bgFillStyleLst>
+    </a:fmtScheme>
+  </a:themeElements>
+  <a:objectDefaults/>
+  <a:extraClrSchemeLst/>
+  <a:extLst>
+    <a:ext uri="{05A4C25C-085E-4340-85A3-A5531E510DB2}">
+      <thm15:themeFamily xmlns:thm15="http://schemas.microsoft.com/office/thememl/2012/main" name="Office Theme" id="{62F939B6-93AF-4DB8-9C6B-D6C7DFDC589F}" vid="{4A3C46E8-61CC-4603-A589-7422A47A8E4A}"/>
+    </a:ext>
+  </a:extLst>
+</a:theme>
 </file>
</xml_diff>